<commit_message>
cc-eval: update to ppt
</commit_message>
<xml_diff>
--- a/ppt-ietf86-rmcat-cc-eval-00.pptx
+++ b/ppt-ietf86-rmcat-cc-eval-00.pptx
@@ -3985,12 +3985,13 @@
             </a:r>
             <a:r>
               <a:rPr lang="en-US" dirty="0" smtClean="0"/>
-              <a:t>(3/</a:t>
-            </a:r>
-            <a:r>
-              <a:rPr lang="en-US" dirty="0"/>
-              <a:t>4)</a:t>
-            </a:r>
+              <a:t>(3</a:t>
+            </a:r>
+            <a:r>
+              <a:rPr lang="en-US" dirty="0" smtClean="0"/>
+              <a:t>/3)</a:t>
+            </a:r>
+            <a:endParaRPr lang="en-US" dirty="0"/>
           </a:p>
         </p:txBody>
       </p:sp>
@@ -4969,6 +4970,8 @@
               <a:rPr lang="en-US" dirty="0" smtClean="0"/>
               <a:t>Quality metric</a:t>
             </a:r>
+          </a:p>
+          <a:p>
             <a:endParaRPr lang="en-US" dirty="0" smtClean="0"/>
           </a:p>
           <a:p>
@@ -4986,6 +4989,13 @@
   <p:clrMapOvr>
     <a:masterClrMapping/>
   </p:clrMapOvr>
+  <p:timing>
+    <p:tnLst>
+      <p:par>
+        <p:cTn xmlns:p14="http://schemas.microsoft.com/office/powerpoint/2010/main" id="1" dur="indefinite" restart="never" nodeType="tmRoot"/>
+      </p:par>
+    </p:tnLst>
+  </p:timing>
 </p:sld>
 </file>
 
@@ -5064,21 +5074,17 @@
           <a:p>
             <a:r>
               <a:rPr lang="en-US" dirty="0" smtClean="0"/>
-              <a:t>Main Open Issue: </a:t>
-            </a:r>
-            <a:r>
-              <a:rPr lang="en-US" dirty="0" smtClean="0">
-                <a:solidFill>
-                  <a:srgbClr val="FF0000"/>
-                </a:solidFill>
-              </a:rPr>
+              <a:t>Open </a:t>
+            </a:r>
+            <a:r>
+              <a:rPr lang="en-US" dirty="0" smtClean="0"/>
+              <a:t>Issue: </a:t>
+            </a:r>
+            <a:r>
+              <a:rPr lang="en-US" dirty="0" smtClean="0"/>
               <a:t>Metrics</a:t>
             </a:r>
-            <a:endParaRPr lang="en-US" dirty="0" smtClean="0">
-              <a:solidFill>
-                <a:srgbClr val="FF0000"/>
-              </a:solidFill>
-            </a:endParaRPr>
+            <a:endParaRPr lang="en-US" dirty="0" smtClean="0"/>
           </a:p>
           <a:p>
             <a:pPr lvl="1"/>
@@ -5091,14 +5097,19 @@
             <a:pPr lvl="2"/>
             <a:r>
               <a:rPr lang="en-US" dirty="0"/>
-              <a:t>To measure trade-off of throughput and delay?</a:t>
-            </a:r>
-          </a:p>
-          <a:p>
-            <a:pPr lvl="2"/>
+              <a:t>To measure trade-off of throughput and </a:t>
+            </a:r>
             <a:r>
               <a:rPr lang="en-US" dirty="0" smtClean="0"/>
-              <a:t>Put in MAX ALLOWED END TO END DELAY</a:t>
+              <a:t>delay.</a:t>
+            </a:r>
+            <a:endParaRPr lang="en-US" dirty="0"/>
+          </a:p>
+          <a:p>
+            <a:pPr lvl="1"/>
+            <a:r>
+              <a:rPr lang="en-US" dirty="0" smtClean="0"/>
+              <a:t>maximum end-to-end delay</a:t>
             </a:r>
           </a:p>
           <a:p>
@@ -5266,7 +5277,15 @@
             <a:r>
               <a:rPr lang="en-US" dirty="0" smtClean="0">
                 <a:solidFill>
-                  <a:srgbClr val="FF0000"/>
+                  <a:schemeClr val="accent2"/>
+                </a:solidFill>
+              </a:rPr>
+              <a:t>consensus to </a:t>
+            </a:r>
+            <a:r>
+              <a:rPr lang="en-US" dirty="0" smtClean="0">
+                <a:solidFill>
+                  <a:srgbClr val="C0504D"/>
                 </a:solidFill>
               </a:rPr>
               <a:t>remove it?</a:t>
@@ -5412,18 +5431,18 @@
               <a:buAutoNum type="arabicPeriod"/>
             </a:pPr>
             <a:r>
-              <a:rPr lang="en-US" b="1" dirty="0" smtClean="0"/>
+              <a:rPr lang="en-US" dirty="0" smtClean="0"/>
               <a:t>Media </a:t>
             </a:r>
             <a:r>
-              <a:rPr lang="en-US" b="1" dirty="0"/>
+              <a:rPr lang="en-US" dirty="0"/>
               <a:t>Traffic </a:t>
             </a:r>
           </a:p>
           <a:p>
             <a:pPr lvl="1"/>
             <a:r>
-              <a:rPr lang="en-US" b="1" dirty="0" smtClean="0"/>
+              <a:rPr lang="en-US" dirty="0" smtClean="0"/>
               <a:t>Variable motion, series of variable talk spurts</a:t>
             </a:r>
           </a:p>
@@ -5503,23 +5522,18 @@
                   </a:schemeClr>
                 </a:solidFill>
               </a:rPr>
-              <a:t>on Cross-Traffic</a:t>
-            </a:r>
-            <a:r>
-              <a:rPr lang="en-US" dirty="0">
+              <a:t>on Cross-</a:t>
+            </a:r>
+            <a:r>
+              <a:rPr lang="en-US" dirty="0" smtClean="0">
                 <a:solidFill>
-                  <a:srgbClr val="FF0000"/>
+                  <a:schemeClr val="tx1">
+                    <a:lumMod val="50000"/>
+                    <a:lumOff val="50000"/>
+                  </a:schemeClr>
                 </a:solidFill>
               </a:rPr>
-              <a:t> </a:t>
-            </a:r>
-            <a:r>
-              <a:rPr lang="en-US" dirty="0" smtClean="0">
-                <a:solidFill>
-                  <a:srgbClr val="FF0000"/>
-                </a:solidFill>
-              </a:rPr>
-              <a:t>[remove it?]</a:t>
+              <a:t>Traffic</a:t>
             </a:r>
             <a:endParaRPr lang="en-US" dirty="0" smtClean="0">
               <a:solidFill>
@@ -5616,12 +5630,14 @@
         </p:nvSpPr>
         <p:spPr/>
         <p:txBody>
-          <a:bodyPr/>
+          <a:bodyPr>
+            <a:normAutofit fontScale="90000"/>
+          </a:bodyPr>
           <a:lstStyle/>
           <a:p>
             <a:r>
               <a:rPr lang="en-US" dirty="0" smtClean="0"/>
-              <a:t>Evaluation Scenarios</a:t>
+              <a:t>Evaluation Scenarios: Startup Values</a:t>
             </a:r>
             <a:endParaRPr lang="en-US" dirty="0"/>
           </a:p>
@@ -5639,69 +5655,91 @@
         </p:nvSpPr>
         <p:spPr/>
         <p:txBody>
-          <a:bodyPr/>
-          <a:lstStyle/>
-          <a:p>
-            <a:r>
-              <a:rPr lang="en-US" dirty="0"/>
+          <a:bodyPr>
+            <a:normAutofit fontScale="92500" lnSpcReduction="10000"/>
+          </a:bodyPr>
+          <a:lstStyle/>
+          <a:p>
+            <a:r>
+              <a:rPr lang="en-US" sz="2800" dirty="0"/>
               <a:t>Video Start Rate: 128 </a:t>
             </a:r>
             <a:r>
-              <a:rPr lang="en-US" dirty="0" smtClean="0"/>
+              <a:rPr lang="en-US" sz="2800" dirty="0" smtClean="0"/>
               <a:t>kbps</a:t>
             </a:r>
           </a:p>
           <a:p>
-            <a:r>
-              <a:rPr lang="en-US" dirty="0"/>
+            <a:pPr lvl="1"/>
+            <a:endParaRPr lang="en-US" sz="2400" dirty="0" smtClean="0"/>
+          </a:p>
+          <a:p>
+            <a:r>
+              <a:rPr lang="en-US" sz="2800" dirty="0"/>
               <a:t>Maximum end-to-end delay: </a:t>
             </a:r>
             <a:r>
-              <a:rPr lang="en-US" dirty="0" smtClean="0"/>
+              <a:rPr lang="en-US" sz="2800" dirty="0" smtClean="0"/>
               <a:t>300ms</a:t>
             </a:r>
           </a:p>
           <a:p>
             <a:pPr lvl="1"/>
             <a:r>
-              <a:rPr lang="en-US" dirty="0" smtClean="0"/>
+              <a:rPr lang="en-US" sz="2400" dirty="0" smtClean="0"/>
               <a:t>200ms, 400ms?</a:t>
             </a:r>
           </a:p>
           <a:p>
             <a:pPr lvl="1"/>
             <a:r>
-              <a:rPr lang="en-US" dirty="0" smtClean="0"/>
+              <a:rPr lang="en-US" sz="2400" dirty="0" smtClean="0"/>
               <a:t>Different for audio and video?</a:t>
             </a:r>
           </a:p>
           <a:p>
-            <a:r>
-              <a:rPr lang="en-US" dirty="0"/>
-              <a:t>Video Frame rate: 15</a:t>
-            </a:r>
-          </a:p>
-          <a:p>
-            <a:r>
-              <a:rPr lang="en-US" dirty="0"/>
+            <a:pPr lvl="2"/>
+            <a:endParaRPr lang="en-US" sz="2000" dirty="0" smtClean="0"/>
+          </a:p>
+          <a:p>
+            <a:r>
+              <a:rPr lang="en-US" sz="2800" dirty="0"/>
+              <a:t>Video Frame rate: </a:t>
+            </a:r>
+            <a:r>
+              <a:rPr lang="en-US" sz="2800" dirty="0" smtClean="0"/>
+              <a:t>15 (30?)</a:t>
+            </a:r>
+          </a:p>
+          <a:p>
+            <a:pPr lvl="1"/>
+            <a:endParaRPr lang="en-US" sz="2400" dirty="0"/>
+          </a:p>
+          <a:p>
+            <a:r>
+              <a:rPr lang="en-US" sz="2800" dirty="0"/>
               <a:t>Audio </a:t>
             </a:r>
             <a:r>
-              <a:rPr lang="en-US" dirty="0" err="1"/>
+              <a:rPr lang="en-US" sz="2800" dirty="0" err="1"/>
               <a:t>packetization</a:t>
             </a:r>
             <a:r>
-              <a:rPr lang="en-US" dirty="0"/>
+              <a:rPr lang="en-US" sz="2800" dirty="0"/>
               <a:t> interval: </a:t>
             </a:r>
             <a:r>
-              <a:rPr lang="en-US" dirty="0" smtClean="0"/>
+              <a:rPr lang="en-US" sz="2800" dirty="0" smtClean="0"/>
               <a:t>20ms</a:t>
             </a:r>
           </a:p>
           <a:p>
-            <a:r>
-              <a:rPr lang="en-US" dirty="0"/>
+            <a:pPr lvl="1"/>
+            <a:endParaRPr lang="en-US" sz="2400" dirty="0" smtClean="0"/>
+          </a:p>
+          <a:p>
+            <a:r>
+              <a:rPr lang="en-US" sz="2800" dirty="0"/>
               <a:t>MTU: 1450 bytes</a:t>
             </a:r>
           </a:p>
@@ -5717,6 +5755,13 @@
   <p:clrMapOvr>
     <a:masterClrMapping/>
   </p:clrMapOvr>
+  <p:timing>
+    <p:tnLst>
+      <p:par>
+        <p:cTn xmlns:p14="http://schemas.microsoft.com/office/powerpoint/2010/main" id="1" dur="indefinite" restart="never" nodeType="tmRoot"/>
+      </p:par>
+    </p:tnLst>
+  </p:timing>
 </p:sld>
 </file>
 
@@ -5772,7 +5817,9 @@
         </p:nvSpPr>
         <p:spPr/>
         <p:txBody>
-          <a:bodyPr/>
+          <a:bodyPr>
+            <a:normAutofit/>
+          </a:bodyPr>
           <a:lstStyle/>
           <a:p>
             <a:r>
@@ -5845,10 +5892,20 @@
           <a:p>
             <a:pPr lvl="1"/>
             <a:r>
+              <a:rPr lang="en-US" dirty="0" smtClean="0"/>
+              <a:t>Examples at: </a:t>
+            </a:r>
+            <a:r>
+              <a:rPr lang="en-US" dirty="0" smtClean="0">
+                <a:hlinkClick r:id="rId2"/>
+              </a:rPr>
+              <a:t>http</a:t>
+            </a:r>
+            <a:r>
               <a:rPr lang="en-US" dirty="0">
                 <a:hlinkClick r:id="rId2"/>
               </a:rPr>
-              <a:t>http://media.xiph.org/video/derf</a:t>
+              <a:t>://media.xiph.org/video/derf</a:t>
             </a:r>
             <a:r>
               <a:rPr lang="en-US" dirty="0" smtClean="0">
@@ -5874,6 +5931,13 @@
   <p:clrMapOvr>
     <a:masterClrMapping/>
   </p:clrMapOvr>
+  <p:timing>
+    <p:tnLst>
+      <p:par>
+        <p:cTn xmlns:p14="http://schemas.microsoft.com/office/powerpoint/2010/main" id="1" dur="indefinite" restart="never" nodeType="tmRoot"/>
+      </p:par>
+    </p:tnLst>
+  </p:timing>
 </p:sld>
 </file>
 
@@ -7000,6 +7064,13 @@
   <p:clrMapOvr>
     <a:masterClrMapping/>
   </p:clrMapOvr>
+  <p:timing>
+    <p:tnLst>
+      <p:par>
+        <p:cTn xmlns:p14="http://schemas.microsoft.com/office/powerpoint/2010/main" id="1" dur="indefinite" restart="never" nodeType="tmRoot"/>
+      </p:par>
+    </p:tnLst>
+  </p:timing>
 </p:sld>
 </file>
 
@@ -7037,7 +7108,11 @@
           <a:p>
             <a:r>
               <a:rPr lang="en-US" dirty="0" smtClean="0"/>
-              <a:t>Evaluation Scenarios (1/4)</a:t>
+              <a:t>Evaluation Scenarios (1</a:t>
+            </a:r>
+            <a:r>
+              <a:rPr lang="en-US" dirty="0" smtClean="0"/>
+              <a:t>/3)</a:t>
             </a:r>
             <a:endParaRPr lang="en-US" dirty="0"/>
           </a:p>
@@ -7467,7 +7542,7 @@
         </p:nvSpPr>
         <p:spPr>
           <a:xfrm>
-            <a:off x="457200" y="5047776"/>
+            <a:off x="6687920" y="5934670"/>
             <a:ext cx="2456080" cy="923330"/>
           </a:xfrm>
           <a:prstGeom prst="rect">
@@ -7568,6 +7643,90 @@
           <a:p>
             <a:pPr algn="ctr"/>
             <a:endParaRPr lang="en-US" dirty="0"/>
+          </a:p>
+        </p:txBody>
+      </p:sp>
+      <p:sp>
+        <p:nvSpPr>
+          <p:cNvPr id="5" name="TextBox 4"/>
+          <p:cNvSpPr txBox="1"/>
+          <p:nvPr/>
+        </p:nvSpPr>
+        <p:spPr>
+          <a:xfrm>
+            <a:off x="3714743" y="4281675"/>
+            <a:ext cx="2250736" cy="1384995"/>
+          </a:xfrm>
+          <a:prstGeom prst="rect">
+            <a:avLst/>
+          </a:prstGeom>
+          <a:noFill/>
+        </p:spPr>
+        <p:txBody>
+          <a:bodyPr wrap="none" rtlCol="0">
+            <a:spAutoFit/>
+          </a:bodyPr>
+          <a:lstStyle/>
+          <a:p>
+            <a:r>
+              <a:rPr lang="en-US" sz="2800" dirty="0" smtClean="0"/>
+              <a:t>Bottleneck:</a:t>
+            </a:r>
+          </a:p>
+          <a:p>
+            <a:r>
+              <a:rPr lang="en-US" sz="2800" dirty="0" smtClean="0"/>
+              <a:t>0.5, 1, 5 Mbps</a:t>
+            </a:r>
+          </a:p>
+          <a:p>
+            <a:r>
+              <a:rPr lang="en-US" sz="2800" dirty="0" smtClean="0"/>
+              <a:t>10, 50, 120ms</a:t>
+            </a:r>
+            <a:endParaRPr lang="en-US" sz="2800" dirty="0"/>
+          </a:p>
+        </p:txBody>
+      </p:sp>
+      <p:sp>
+        <p:nvSpPr>
+          <p:cNvPr id="6" name="TextBox 5"/>
+          <p:cNvSpPr txBox="1"/>
+          <p:nvPr/>
+        </p:nvSpPr>
+        <p:spPr>
+          <a:xfrm>
+            <a:off x="1749777" y="4436346"/>
+            <a:ext cx="1099279" cy="1200328"/>
+          </a:xfrm>
+          <a:prstGeom prst="rect">
+            <a:avLst/>
+          </a:prstGeom>
+          <a:noFill/>
+        </p:spPr>
+        <p:txBody>
+          <a:bodyPr wrap="none" rtlCol="0">
+            <a:spAutoFit/>
+          </a:bodyPr>
+          <a:lstStyle/>
+          <a:p>
+            <a:r>
+              <a:rPr lang="en-US" sz="2400" dirty="0" smtClean="0"/>
+              <a:t>Access:</a:t>
+            </a:r>
+          </a:p>
+          <a:p>
+            <a:r>
+              <a:rPr lang="en-US" sz="2400" dirty="0" smtClean="0"/>
+              <a:t>WLAN</a:t>
+            </a:r>
+          </a:p>
+          <a:p>
+            <a:r>
+              <a:rPr lang="en-US" sz="2400" dirty="0" smtClean="0"/>
+              <a:t>ADSL</a:t>
+            </a:r>
+            <a:endParaRPr lang="en-US" sz="2400" dirty="0"/>
           </a:p>
         </p:txBody>
       </p:sp>
@@ -7629,12 +7788,13 @@
             </a:r>
             <a:r>
               <a:rPr lang="en-US" dirty="0" smtClean="0"/>
-              <a:t>(2/</a:t>
-            </a:r>
-            <a:r>
-              <a:rPr lang="en-US" dirty="0"/>
-              <a:t>4)</a:t>
-            </a:r>
+              <a:t>(2</a:t>
+            </a:r>
+            <a:r>
+              <a:rPr lang="en-US" dirty="0" smtClean="0"/>
+              <a:t>/3)</a:t>
+            </a:r>
+            <a:endParaRPr lang="en-US" dirty="0"/>
           </a:p>
         </p:txBody>
       </p:sp>
@@ -9207,6 +9367,83 @@
           </p:txBody>
         </p:sp>
       </p:grpSp>
+      <p:sp>
+        <p:nvSpPr>
+          <p:cNvPr id="6" name="TextBox 5"/>
+          <p:cNvSpPr txBox="1"/>
+          <p:nvPr/>
+        </p:nvSpPr>
+        <p:spPr>
+          <a:xfrm>
+            <a:off x="3838221" y="5934670"/>
+            <a:ext cx="1273681" cy="923330"/>
+          </a:xfrm>
+          <a:prstGeom prst="rect">
+            <a:avLst/>
+          </a:prstGeom>
+          <a:noFill/>
+        </p:spPr>
+        <p:txBody>
+          <a:bodyPr wrap="none" rtlCol="0">
+            <a:spAutoFit/>
+          </a:bodyPr>
+          <a:lstStyle/>
+          <a:p>
+            <a:r>
+              <a:rPr lang="en-US" b="1" dirty="0" smtClean="0"/>
+              <a:t>Bottleneck:</a:t>
+            </a:r>
+          </a:p>
+          <a:p>
+            <a:r>
+              <a:rPr lang="en-US" dirty="0" smtClean="0"/>
+              <a:t>0.5, </a:t>
+            </a:r>
+            <a:r>
+              <a:rPr lang="en-US" dirty="0"/>
+              <a:t>5Mbps </a:t>
+            </a:r>
+            <a:endParaRPr lang="en-US" dirty="0" smtClean="0"/>
+          </a:p>
+          <a:p>
+            <a:r>
+              <a:rPr lang="en-US" dirty="0" smtClean="0"/>
+              <a:t>20ms</a:t>
+            </a:r>
+            <a:endParaRPr lang="en-US" dirty="0"/>
+          </a:p>
+        </p:txBody>
+      </p:sp>
+      <p:sp>
+        <p:nvSpPr>
+          <p:cNvPr id="7" name="TextBox 6"/>
+          <p:cNvSpPr txBox="1"/>
+          <p:nvPr/>
+        </p:nvSpPr>
+        <p:spPr>
+          <a:xfrm>
+            <a:off x="1161806" y="6204207"/>
+            <a:ext cx="1716861" cy="369332"/>
+          </a:xfrm>
+          <a:prstGeom prst="rect">
+            <a:avLst/>
+          </a:prstGeom>
+          <a:noFill/>
+        </p:spPr>
+        <p:txBody>
+          <a:bodyPr wrap="none" rtlCol="0">
+            <a:spAutoFit/>
+          </a:bodyPr>
+          <a:lstStyle/>
+          <a:p>
+            <a:r>
+              <a:rPr lang="en-US" b="1" dirty="0" smtClean="0"/>
+              <a:t>3G or LTE traces</a:t>
+            </a:r>
+            <a:endParaRPr lang="en-US" b="1" dirty="0"/>
+          </a:p>
+        </p:txBody>
+      </p:sp>
     </p:spTree>
     <p:extLst>
       <p:ext uri="{BB962C8B-B14F-4D97-AF65-F5344CB8AC3E}">

</xml_diff>

<commit_message>
cc-eval: some more updates
</commit_message>
<xml_diff>
--- a/ppt-ietf86-rmcat-cc-eval-00.pptx
+++ b/ppt-ietf86-rmcat-cc-eval-00.pptx
@@ -5272,29 +5272,8 @@
             </a:r>
             <a:r>
               <a:rPr lang="en-US" dirty="0" smtClean="0"/>
-              <a:t>with TCP [</a:t>
-            </a:r>
-            <a:r>
-              <a:rPr lang="en-US" dirty="0" smtClean="0">
-                <a:solidFill>
-                  <a:schemeClr val="accent2"/>
-                </a:solidFill>
-              </a:rPr>
-              <a:t>consensus to </a:t>
-            </a:r>
-            <a:r>
-              <a:rPr lang="en-US" dirty="0" smtClean="0">
-                <a:solidFill>
-                  <a:srgbClr val="C0504D"/>
-                </a:solidFill>
-              </a:rPr>
-              <a:t>remove it?</a:t>
-            </a:r>
-            <a:r>
-              <a:rPr lang="en-US" dirty="0" smtClean="0"/>
-              <a:t>]</a:t>
-            </a:r>
-            <a:endParaRPr lang="en-US" dirty="0" smtClean="0"/>
+              <a:t>with TCP </a:t>
+            </a:r>
           </a:p>
           <a:p>
             <a:pPr lvl="1"/>
@@ -5631,13 +5610,13 @@
         <p:spPr/>
         <p:txBody>
           <a:bodyPr>
-            <a:normAutofit fontScale="90000"/>
+            <a:normAutofit/>
           </a:bodyPr>
           <a:lstStyle/>
           <a:p>
             <a:r>
               <a:rPr lang="en-US" dirty="0" smtClean="0"/>
-              <a:t>Evaluation Scenarios: Startup Values</a:t>
+              <a:t>Evaluation Scenarios: Parameters</a:t>
             </a:r>
             <a:endParaRPr lang="en-US" dirty="0"/>
           </a:p>
@@ -5656,7 +5635,7 @@
         <p:spPr/>
         <p:txBody>
           <a:bodyPr>
-            <a:normAutofit fontScale="92500" lnSpcReduction="10000"/>
+            <a:normAutofit fontScale="85000" lnSpcReduction="20000"/>
           </a:bodyPr>
           <a:lstStyle/>
           <a:p>
@@ -5708,7 +5687,7 @@
             </a:r>
             <a:r>
               <a:rPr lang="en-US" sz="2800" dirty="0" smtClean="0"/>
-              <a:t>15 (30?)</a:t>
+              <a:t>15 FPS (30?)</a:t>
             </a:r>
           </a:p>
           <a:p>
@@ -5740,8 +5719,22 @@
           <a:p>
             <a:r>
               <a:rPr lang="en-US" sz="2800" dirty="0"/>
-              <a:t>MTU: 1450 bytes</a:t>
-            </a:r>
+              <a:t>MTU: 1450 </a:t>
+            </a:r>
+            <a:r>
+              <a:rPr lang="en-US" sz="2800" dirty="0" smtClean="0"/>
+              <a:t>bytes</a:t>
+            </a:r>
+          </a:p>
+          <a:p>
+            <a:endParaRPr lang="en-US" sz="2800" dirty="0"/>
+          </a:p>
+          <a:p>
+            <a:r>
+              <a:rPr lang="en-US" sz="2800" dirty="0" smtClean="0"/>
+              <a:t>Router Queue length: ?</a:t>
+            </a:r>
+            <a:endParaRPr lang="en-US" sz="2800" dirty="0"/>
           </a:p>
         </p:txBody>
       </p:sp>
@@ -7697,7 +7690,7 @@
         <p:spPr>
           <a:xfrm>
             <a:off x="1749777" y="4436346"/>
-            <a:ext cx="1099279" cy="1200328"/>
+            <a:ext cx="1114157" cy="1200328"/>
           </a:xfrm>
           <a:prstGeom prst="rect">
             <a:avLst/>
@@ -7711,7 +7704,7 @@
           <a:lstStyle/>
           <a:p>
             <a:r>
-              <a:rPr lang="en-US" sz="2400" dirty="0" smtClean="0"/>
+              <a:rPr lang="en-US" sz="2400" b="1" dirty="0" smtClean="0"/>
               <a:t>Access:</a:t>
             </a:r>
           </a:p>
@@ -7808,7 +7801,12 @@
             <p:ph idx="1"/>
           </p:nvPr>
         </p:nvSpPr>
-        <p:spPr/>
+        <p:spPr>
+          <a:xfrm>
+            <a:off x="633304" y="1713521"/>
+            <a:ext cx="8229600" cy="4525963"/>
+          </a:xfrm>
+        </p:spPr>
         <p:txBody>
           <a:bodyPr/>
           <a:lstStyle/>
@@ -9444,6 +9442,36 @@
           </a:p>
         </p:txBody>
       </p:sp>
+      <p:sp>
+        <p:nvSpPr>
+          <p:cNvPr id="46" name="TextBox 45"/>
+          <p:cNvSpPr txBox="1"/>
+          <p:nvPr/>
+        </p:nvSpPr>
+        <p:spPr>
+          <a:xfrm>
+            <a:off x="3838221" y="2623841"/>
+            <a:ext cx="1716861" cy="369332"/>
+          </a:xfrm>
+          <a:prstGeom prst="rect">
+            <a:avLst/>
+          </a:prstGeom>
+          <a:noFill/>
+        </p:spPr>
+        <p:txBody>
+          <a:bodyPr wrap="none" rtlCol="0">
+            <a:spAutoFit/>
+          </a:bodyPr>
+          <a:lstStyle/>
+          <a:p>
+            <a:r>
+              <a:rPr lang="en-US" b="1" dirty="0" smtClean="0"/>
+              <a:t>3G or LTE traces</a:t>
+            </a:r>
+            <a:endParaRPr lang="en-US" b="1" dirty="0"/>
+          </a:p>
+        </p:txBody>
+      </p:sp>
     </p:spTree>
     <p:extLst>
       <p:ext uri="{BB962C8B-B14F-4D97-AF65-F5344CB8AC3E}">
@@ -9690,39 +9718,21 @@
                                   </p:childTnLst>
                                 </p:cTn>
                               </p:par>
-                            </p:childTnLst>
-                          </p:cTn>
-                        </p:par>
-                      </p:childTnLst>
-                    </p:cTn>
-                  </p:par>
-                  <p:par>
-                    <p:cTn id="21" fill="hold">
-                      <p:stCondLst>
-                        <p:cond delay="indefinite"/>
-                      </p:stCondLst>
-                      <p:childTnLst>
-                        <p:par>
-                          <p:cTn id="22" fill="hold">
-                            <p:stCondLst>
-                              <p:cond delay="0"/>
-                            </p:stCondLst>
-                            <p:childTnLst>
                               <p:par>
-                                <p:cTn id="23" presetID="1" presetClass="entr" presetSubtype="0" fill="hold" grpId="0" nodeType="clickEffect">
+                                <p:cTn id="21" presetID="1" presetClass="entr" presetSubtype="0" fill="hold" grpId="0" nodeType="withEffect">
                                   <p:stCondLst>
                                     <p:cond delay="0"/>
                                   </p:stCondLst>
                                   <p:childTnLst>
                                     <p:set>
                                       <p:cBhvr>
-                                        <p:cTn id="24" dur="1" fill="hold">
+                                        <p:cTn id="22" dur="1" fill="hold">
                                           <p:stCondLst>
                                             <p:cond delay="0"/>
                                           </p:stCondLst>
                                         </p:cTn>
                                         <p:tgtEl>
-                                          <p:spTgt spid="17"/>
+                                          <p:spTgt spid="46"/>
                                         </p:tgtEl>
                                         <p:attrNameLst>
                                           <p:attrName>style.visibility</p:attrName>
@@ -9735,8 +9745,26 @@
                                   </p:childTnLst>
                                 </p:cTn>
                               </p:par>
+                            </p:childTnLst>
+                          </p:cTn>
+                        </p:par>
+                      </p:childTnLst>
+                    </p:cTn>
+                  </p:par>
+                  <p:par>
+                    <p:cTn id="23" fill="hold">
+                      <p:stCondLst>
+                        <p:cond delay="indefinite"/>
+                      </p:stCondLst>
+                      <p:childTnLst>
+                        <p:par>
+                          <p:cTn id="24" fill="hold">
+                            <p:stCondLst>
+                              <p:cond delay="0"/>
+                            </p:stCondLst>
+                            <p:childTnLst>
                               <p:par>
-                                <p:cTn id="25" presetID="1" presetClass="entr" presetSubtype="0" fill="hold" grpId="0" nodeType="withEffect">
+                                <p:cTn id="25" presetID="1" presetClass="entr" presetSubtype="0" fill="hold" grpId="0" nodeType="clickEffect">
                                   <p:stCondLst>
                                     <p:cond delay="0"/>
                                   </p:stCondLst>
@@ -9749,7 +9777,7 @@
                                           </p:stCondLst>
                                         </p:cTn>
                                         <p:tgtEl>
-                                          <p:spTgt spid="18"/>
+                                          <p:spTgt spid="17"/>
                                         </p:tgtEl>
                                         <p:attrNameLst>
                                           <p:attrName>style.visibility</p:attrName>
@@ -9776,6 +9804,33 @@
                                           </p:stCondLst>
                                         </p:cTn>
                                         <p:tgtEl>
+                                          <p:spTgt spid="18"/>
+                                        </p:tgtEl>
+                                        <p:attrNameLst>
+                                          <p:attrName>style.visibility</p:attrName>
+                                        </p:attrNameLst>
+                                      </p:cBhvr>
+                                      <p:to>
+                                        <p:strVal val="visible"/>
+                                      </p:to>
+                                    </p:set>
+                                  </p:childTnLst>
+                                </p:cTn>
+                              </p:par>
+                              <p:par>
+                                <p:cTn id="29" presetID="1" presetClass="entr" presetSubtype="0" fill="hold" grpId="0" nodeType="withEffect">
+                                  <p:stCondLst>
+                                    <p:cond delay="0"/>
+                                  </p:stCondLst>
+                                  <p:childTnLst>
+                                    <p:set>
+                                      <p:cBhvr>
+                                        <p:cTn id="30" dur="1" fill="hold">
+                                          <p:stCondLst>
+                                            <p:cond delay="0"/>
+                                          </p:stCondLst>
+                                        </p:cTn>
+                                        <p:tgtEl>
                                           <p:spTgt spid="19"/>
                                         </p:tgtEl>
                                         <p:attrNameLst>
@@ -9790,34 +9845,7 @@
                                 </p:cTn>
                               </p:par>
                               <p:par>
-                                <p:cTn id="29" presetID="1" presetClass="entr" presetSubtype="0" fill="hold" nodeType="withEffect">
-                                  <p:stCondLst>
-                                    <p:cond delay="0"/>
-                                  </p:stCondLst>
-                                  <p:childTnLst>
-                                    <p:set>
-                                      <p:cBhvr>
-                                        <p:cTn id="30" dur="1" fill="hold">
-                                          <p:stCondLst>
-                                            <p:cond delay="0"/>
-                                          </p:stCondLst>
-                                        </p:cTn>
-                                        <p:tgtEl>
-                                          <p:spTgt spid="21"/>
-                                        </p:tgtEl>
-                                        <p:attrNameLst>
-                                          <p:attrName>style.visibility</p:attrName>
-                                        </p:attrNameLst>
-                                      </p:cBhvr>
-                                      <p:to>
-                                        <p:strVal val="visible"/>
-                                      </p:to>
-                                    </p:set>
-                                  </p:childTnLst>
-                                </p:cTn>
-                              </p:par>
-                              <p:par>
-                                <p:cTn id="31" presetID="1" presetClass="entr" presetSubtype="0" fill="hold" grpId="0" nodeType="withEffect">
+                                <p:cTn id="31" presetID="1" presetClass="entr" presetSubtype="0" fill="hold" nodeType="withEffect">
                                   <p:stCondLst>
                                     <p:cond delay="0"/>
                                   </p:stCondLst>
@@ -9830,7 +9858,7 @@
                                           </p:stCondLst>
                                         </p:cTn>
                                         <p:tgtEl>
-                                          <p:spTgt spid="29"/>
+                                          <p:spTgt spid="21"/>
                                         </p:tgtEl>
                                         <p:attrNameLst>
                                           <p:attrName>style.visibility</p:attrName>
@@ -9857,7 +9885,7 @@
                                           </p:stCondLst>
                                         </p:cTn>
                                         <p:tgtEl>
-                                          <p:spTgt spid="33"/>
+                                          <p:spTgt spid="29"/>
                                         </p:tgtEl>
                                         <p:attrNameLst>
                                           <p:attrName>style.visibility</p:attrName>
@@ -9884,7 +9912,7 @@
                                           </p:stCondLst>
                                         </p:cTn>
                                         <p:tgtEl>
-                                          <p:spTgt spid="34"/>
+                                          <p:spTgt spid="33"/>
                                         </p:tgtEl>
                                         <p:attrNameLst>
                                           <p:attrName>style.visibility</p:attrName>
@@ -9911,7 +9939,7 @@
                                           </p:stCondLst>
                                         </p:cTn>
                                         <p:tgtEl>
-                                          <p:spTgt spid="35"/>
+                                          <p:spTgt spid="34"/>
                                         </p:tgtEl>
                                         <p:attrNameLst>
                                           <p:attrName>style.visibility</p:attrName>
@@ -9925,7 +9953,7 @@
                                 </p:cTn>
                               </p:par>
                               <p:par>
-                                <p:cTn id="39" presetID="1" presetClass="entr" presetSubtype="0" fill="hold" nodeType="withEffect">
+                                <p:cTn id="39" presetID="1" presetClass="entr" presetSubtype="0" fill="hold" grpId="0" nodeType="withEffect">
                                   <p:stCondLst>
                                     <p:cond delay="0"/>
                                   </p:stCondLst>
@@ -9938,7 +9966,7 @@
                                           </p:stCondLst>
                                         </p:cTn>
                                         <p:tgtEl>
-                                          <p:spTgt spid="36"/>
+                                          <p:spTgt spid="35"/>
                                         </p:tgtEl>
                                         <p:attrNameLst>
                                           <p:attrName>style.visibility</p:attrName>
@@ -9965,7 +9993,88 @@
                                           </p:stCondLst>
                                         </p:cTn>
                                         <p:tgtEl>
+                                          <p:spTgt spid="36"/>
+                                        </p:tgtEl>
+                                        <p:attrNameLst>
+                                          <p:attrName>style.visibility</p:attrName>
+                                        </p:attrNameLst>
+                                      </p:cBhvr>
+                                      <p:to>
+                                        <p:strVal val="visible"/>
+                                      </p:to>
+                                    </p:set>
+                                  </p:childTnLst>
+                                </p:cTn>
+                              </p:par>
+                              <p:par>
+                                <p:cTn id="43" presetID="1" presetClass="entr" presetSubtype="0" fill="hold" nodeType="withEffect">
+                                  <p:stCondLst>
+                                    <p:cond delay="0"/>
+                                  </p:stCondLst>
+                                  <p:childTnLst>
+                                    <p:set>
+                                      <p:cBhvr>
+                                        <p:cTn id="44" dur="1" fill="hold">
+                                          <p:stCondLst>
+                                            <p:cond delay="0"/>
+                                          </p:stCondLst>
+                                        </p:cTn>
+                                        <p:tgtEl>
                                           <p:spTgt spid="41"/>
+                                        </p:tgtEl>
+                                        <p:attrNameLst>
+                                          <p:attrName>style.visibility</p:attrName>
+                                        </p:attrNameLst>
+                                      </p:cBhvr>
+                                      <p:to>
+                                        <p:strVal val="visible"/>
+                                      </p:to>
+                                    </p:set>
+                                  </p:childTnLst>
+                                </p:cTn>
+                              </p:par>
+                              <p:par>
+                                <p:cTn id="45" presetID="1" presetClass="entr" presetSubtype="0" fill="hold" grpId="0" nodeType="withEffect">
+                                  <p:stCondLst>
+                                    <p:cond delay="0"/>
+                                  </p:stCondLst>
+                                  <p:childTnLst>
+                                    <p:set>
+                                      <p:cBhvr>
+                                        <p:cTn id="46" dur="1" fill="hold">
+                                          <p:stCondLst>
+                                            <p:cond delay="0"/>
+                                          </p:stCondLst>
+                                        </p:cTn>
+                                        <p:tgtEl>
+                                          <p:spTgt spid="7"/>
+                                        </p:tgtEl>
+                                        <p:attrNameLst>
+                                          <p:attrName>style.visibility</p:attrName>
+                                        </p:attrNameLst>
+                                      </p:cBhvr>
+                                      <p:to>
+                                        <p:strVal val="visible"/>
+                                      </p:to>
+                                    </p:set>
+                                  </p:childTnLst>
+                                </p:cTn>
+                              </p:par>
+                              <p:par>
+                                <p:cTn id="47" presetID="1" presetClass="entr" presetSubtype="0" fill="hold" grpId="0" nodeType="withEffect">
+                                  <p:stCondLst>
+                                    <p:cond delay="0"/>
+                                  </p:stCondLst>
+                                  <p:childTnLst>
+                                    <p:set>
+                                      <p:cBhvr>
+                                        <p:cTn id="48" dur="1" fill="hold">
+                                          <p:stCondLst>
+                                            <p:cond delay="0"/>
+                                          </p:stCondLst>
+                                        </p:cTn>
+                                        <p:tgtEl>
+                                          <p:spTgt spid="6"/>
                                         </p:tgtEl>
                                         <p:attrNameLst>
                                           <p:attrName>style.visibility</p:attrName>
@@ -10020,6 +10129,9 @@
       <p:bldP spid="33" grpId="0" animBg="1"/>
       <p:bldP spid="34" grpId="0" animBg="1"/>
       <p:bldP spid="35" grpId="0" animBg="1"/>
+      <p:bldP spid="6" grpId="0"/>
+      <p:bldP spid="7" grpId="0"/>
+      <p:bldP spid="46" grpId="0"/>
     </p:bldLst>
   </p:timing>
 </p:sld>

</xml_diff>

<commit_message>
cc-eval: updated small nits
</commit_message>
<xml_diff>
--- a/ppt-ietf86-rmcat-cc-eval-00.pptx
+++ b/ppt-ietf86-rmcat-cc-eval-00.pptx
@@ -202,7 +202,7 @@
           <a:p>
             <a:fld id="{74F00AB7-AF39-084A-A0BA-5864F0464E28}" type="datetimeFigureOut">
               <a:rPr lang="en-US" smtClean="0"/>
-              <a:t>3/10/13</a:t>
+              <a:t>3/11/13</a:t>
             </a:fld>
             <a:endParaRPr lang="en-US"/>
           </a:p>
@@ -1018,7 +1018,7 @@
           <a:p>
             <a:fld id="{797CEB7D-562C-5E4D-8C0B-7D220ABC0BE1}" type="datetimeFigureOut">
               <a:rPr lang="en-US" smtClean="0"/>
-              <a:t>3/10/13</a:t>
+              <a:t>3/11/13</a:t>
             </a:fld>
             <a:endParaRPr lang="en-US"/>
           </a:p>
@@ -1188,7 +1188,7 @@
           <a:p>
             <a:fld id="{797CEB7D-562C-5E4D-8C0B-7D220ABC0BE1}" type="datetimeFigureOut">
               <a:rPr lang="en-US" smtClean="0"/>
-              <a:t>3/10/13</a:t>
+              <a:t>3/11/13</a:t>
             </a:fld>
             <a:endParaRPr lang="en-US"/>
           </a:p>
@@ -1368,7 +1368,7 @@
           <a:p>
             <a:fld id="{797CEB7D-562C-5E4D-8C0B-7D220ABC0BE1}" type="datetimeFigureOut">
               <a:rPr lang="en-US" smtClean="0"/>
-              <a:t>3/10/13</a:t>
+              <a:t>3/11/13</a:t>
             </a:fld>
             <a:endParaRPr lang="en-US"/>
           </a:p>
@@ -1538,7 +1538,7 @@
           <a:p>
             <a:fld id="{797CEB7D-562C-5E4D-8C0B-7D220ABC0BE1}" type="datetimeFigureOut">
               <a:rPr lang="en-US" smtClean="0"/>
-              <a:t>3/10/13</a:t>
+              <a:t>3/11/13</a:t>
             </a:fld>
             <a:endParaRPr lang="en-US"/>
           </a:p>
@@ -1784,7 +1784,7 @@
           <a:p>
             <a:fld id="{797CEB7D-562C-5E4D-8C0B-7D220ABC0BE1}" type="datetimeFigureOut">
               <a:rPr lang="en-US" smtClean="0"/>
-              <a:t>3/10/13</a:t>
+              <a:t>3/11/13</a:t>
             </a:fld>
             <a:endParaRPr lang="en-US"/>
           </a:p>
@@ -2072,7 +2072,7 @@
           <a:p>
             <a:fld id="{797CEB7D-562C-5E4D-8C0B-7D220ABC0BE1}" type="datetimeFigureOut">
               <a:rPr lang="en-US" smtClean="0"/>
-              <a:t>3/10/13</a:t>
+              <a:t>3/11/13</a:t>
             </a:fld>
             <a:endParaRPr lang="en-US"/>
           </a:p>
@@ -2494,7 +2494,7 @@
           <a:p>
             <a:fld id="{797CEB7D-562C-5E4D-8C0B-7D220ABC0BE1}" type="datetimeFigureOut">
               <a:rPr lang="en-US" smtClean="0"/>
-              <a:t>3/10/13</a:t>
+              <a:t>3/11/13</a:t>
             </a:fld>
             <a:endParaRPr lang="en-US"/>
           </a:p>
@@ -2612,7 +2612,7 @@
           <a:p>
             <a:fld id="{797CEB7D-562C-5E4D-8C0B-7D220ABC0BE1}" type="datetimeFigureOut">
               <a:rPr lang="en-US" smtClean="0"/>
-              <a:t>3/10/13</a:t>
+              <a:t>3/11/13</a:t>
             </a:fld>
             <a:endParaRPr lang="en-US"/>
           </a:p>
@@ -2707,7 +2707,7 @@
           <a:p>
             <a:fld id="{797CEB7D-562C-5E4D-8C0B-7D220ABC0BE1}" type="datetimeFigureOut">
               <a:rPr lang="en-US" smtClean="0"/>
-              <a:t>3/10/13</a:t>
+              <a:t>3/11/13</a:t>
             </a:fld>
             <a:endParaRPr lang="en-US"/>
           </a:p>
@@ -2984,7 +2984,7 @@
           <a:p>
             <a:fld id="{797CEB7D-562C-5E4D-8C0B-7D220ABC0BE1}" type="datetimeFigureOut">
               <a:rPr lang="en-US" smtClean="0"/>
-              <a:t>3/10/13</a:t>
+              <a:t>3/11/13</a:t>
             </a:fld>
             <a:endParaRPr lang="en-US"/>
           </a:p>
@@ -3237,7 +3237,7 @@
           <a:p>
             <a:fld id="{797CEB7D-562C-5E4D-8C0B-7D220ABC0BE1}" type="datetimeFigureOut">
               <a:rPr lang="en-US" smtClean="0"/>
-              <a:t>3/10/13</a:t>
+              <a:t>3/11/13</a:t>
             </a:fld>
             <a:endParaRPr lang="en-US"/>
           </a:p>
@@ -3450,7 +3450,7 @@
           <a:p>
             <a:fld id="{797CEB7D-562C-5E4D-8C0B-7D220ABC0BE1}" type="datetimeFigureOut">
               <a:rPr lang="en-US" smtClean="0"/>
-              <a:t>3/10/13</a:t>
+              <a:t>3/11/13</a:t>
             </a:fld>
             <a:endParaRPr lang="en-US"/>
           </a:p>
@@ -3866,32 +3866,29 @@
         </p:spPr>
         <p:txBody>
           <a:bodyPr>
-            <a:normAutofit/>
+            <a:normAutofit fontScale="92500" lnSpcReduction="20000"/>
           </a:bodyPr>
           <a:lstStyle/>
           <a:p>
             <a:r>
               <a:rPr lang="en-US" dirty="0" smtClean="0"/>
-              <a:t>draft-singh-rmcat-cc-eval-</a:t>
-            </a:r>
+              <a:t>draft-singh-rmcat-cc-eval-02</a:t>
+            </a:r>
+          </a:p>
+          <a:p>
             <a:r>
               <a:rPr lang="en-US" dirty="0" smtClean="0"/>
-              <a:t>02</a:t>
-            </a:r>
-            <a:endParaRPr lang="en-US" dirty="0" smtClean="0"/>
-          </a:p>
-          <a:p>
-            <a:r>
-              <a:rPr lang="en-US" dirty="0" smtClean="0"/>
-              <a:t>11</a:t>
-            </a:r>
-            <a:r>
-              <a:rPr lang="en-US" dirty="0" smtClean="0"/>
-              <a:t>. March </a:t>
+              <a:t>11. March </a:t>
             </a:r>
             <a:r>
               <a:rPr lang="en-US" dirty="0" smtClean="0"/>
               <a:t>2012</a:t>
+            </a:r>
+          </a:p>
+          <a:p>
+            <a:r>
+              <a:rPr lang="en-US" dirty="0" smtClean="0"/>
+              <a:t>IETF 86 Orlando</a:t>
             </a:r>
             <a:endParaRPr lang="en-US" dirty="0"/>
           </a:p>
@@ -3985,11 +3982,7 @@
             </a:r>
             <a:r>
               <a:rPr lang="en-US" dirty="0" smtClean="0"/>
-              <a:t>(3</a:t>
-            </a:r>
-            <a:r>
-              <a:rPr lang="en-US" dirty="0" smtClean="0"/>
-              <a:t>/3)</a:t>
+              <a:t>(3/3)</a:t>
             </a:r>
             <a:endParaRPr lang="en-US" dirty="0"/>
           </a:p>
@@ -4950,11 +4943,7 @@
           <a:p>
             <a:r>
               <a:rPr lang="en-US" dirty="0" smtClean="0"/>
-              <a:t>Other metrics</a:t>
-            </a:r>
-            <a:r>
-              <a:rPr lang="en-US" dirty="0" smtClean="0"/>
-              <a:t>?</a:t>
+              <a:t>Other metrics?</a:t>
             </a:r>
           </a:p>
           <a:p>
@@ -4968,8 +4957,27 @@
             <a:pPr lvl="1"/>
             <a:r>
               <a:rPr lang="en-US" dirty="0" smtClean="0"/>
-              <a:t>Quality metric</a:t>
-            </a:r>
+              <a:t>Quality </a:t>
+            </a:r>
+            <a:r>
+              <a:rPr lang="en-US" dirty="0" smtClean="0"/>
+              <a:t>metric</a:t>
+            </a:r>
+          </a:p>
+          <a:p>
+            <a:pPr lvl="1"/>
+            <a:endParaRPr lang="en-US" dirty="0"/>
+          </a:p>
+          <a:p>
+            <a:r>
+              <a:rPr lang="en-US" smtClean="0"/>
+              <a:t>More scenarios</a:t>
+            </a:r>
+            <a:r>
+              <a:rPr lang="en-US" dirty="0" smtClean="0"/>
+              <a:t>…</a:t>
+            </a:r>
+            <a:endParaRPr lang="en-US" dirty="0" smtClean="0"/>
           </a:p>
           <a:p>
             <a:endParaRPr lang="en-US" dirty="0" smtClean="0"/>
@@ -5051,20 +5059,25 @@
         </p:nvSpPr>
         <p:spPr/>
         <p:txBody>
-          <a:bodyPr/>
+          <a:bodyPr>
+            <a:normAutofit lnSpcReduction="10000"/>
+          </a:bodyPr>
           <a:lstStyle/>
           <a:p>
             <a:r>
               <a:rPr lang="en-US" dirty="0" smtClean="0"/>
-              <a:t>02  version makes </a:t>
+              <a:t>02  version makes some changes based on input from last </a:t>
             </a:r>
             <a:r>
               <a:rPr lang="en-US" dirty="0" smtClean="0"/>
-              <a:t>some changes based on </a:t>
-            </a:r>
+              <a:t>IETF</a:t>
+            </a:r>
+          </a:p>
+          <a:p>
+            <a:pPr lvl="1"/>
             <a:r>
               <a:rPr lang="en-US" dirty="0" smtClean="0"/>
-              <a:t>input from last IETF</a:t>
+              <a:t>Added scenarios</a:t>
             </a:r>
             <a:endParaRPr lang="en-US" dirty="0" smtClean="0"/>
           </a:p>
@@ -5074,17 +5087,8 @@
           <a:p>
             <a:r>
               <a:rPr lang="en-US" dirty="0" smtClean="0"/>
-              <a:t>Open </a:t>
-            </a:r>
-            <a:r>
-              <a:rPr lang="en-US" dirty="0" smtClean="0"/>
-              <a:t>Issue: </a:t>
-            </a:r>
-            <a:r>
-              <a:rPr lang="en-US" dirty="0" smtClean="0"/>
-              <a:t>Metrics</a:t>
-            </a:r>
-            <a:endParaRPr lang="en-US" dirty="0" smtClean="0"/>
+              <a:t>Open Issue: Metrics</a:t>
+            </a:r>
           </a:p>
           <a:p>
             <a:pPr lvl="1"/>
@@ -5204,11 +5208,7 @@
           <a:p>
             <a:r>
               <a:rPr lang="en-US" dirty="0" smtClean="0"/>
-              <a:t>Bandwidth </a:t>
-            </a:r>
-            <a:r>
-              <a:rPr lang="en-US" dirty="0" smtClean="0"/>
-              <a:t>Utilization </a:t>
+              <a:t>Bandwidth Utilization </a:t>
             </a:r>
           </a:p>
           <a:p>
@@ -5217,11 +5217,7 @@
             </a:pPr>
             <a:r>
               <a:rPr lang="en-US" dirty="0" smtClean="0"/>
-              <a:t>= RTP media rate/</a:t>
-            </a:r>
-            <a:r>
-              <a:rPr lang="en-US" dirty="0" smtClean="0"/>
-              <a:t> bottleneck-link capacity</a:t>
+              <a:t>= RTP media rate/ bottleneck-link capacity</a:t>
             </a:r>
           </a:p>
           <a:p>
@@ -5250,15 +5246,7 @@
             <a:pPr lvl="1"/>
             <a:r>
               <a:rPr lang="en-US" dirty="0" smtClean="0"/>
-              <a:t>Media rate of all flows s</a:t>
-            </a:r>
-            <a:r>
-              <a:rPr lang="en-US" dirty="0" smtClean="0"/>
-              <a:t>hould </a:t>
-            </a:r>
-            <a:r>
-              <a:rPr lang="en-US" dirty="0" smtClean="0"/>
-              <a:t>be equal?</a:t>
+              <a:t>Media rate of all flows should be equal?</a:t>
             </a:r>
           </a:p>
           <a:p>
@@ -5268,11 +5256,7 @@
           <a:p>
             <a:r>
               <a:rPr lang="en-US" dirty="0" smtClean="0"/>
-              <a:t>Fair share </a:t>
-            </a:r>
-            <a:r>
-              <a:rPr lang="en-US" dirty="0" smtClean="0"/>
-              <a:t>with TCP </a:t>
+              <a:t>Fair share with TCP </a:t>
             </a:r>
           </a:p>
           <a:p>
@@ -7101,11 +7085,7 @@
           <a:p>
             <a:r>
               <a:rPr lang="en-US" dirty="0" smtClean="0"/>
-              <a:t>Evaluation Scenarios (1</a:t>
-            </a:r>
-            <a:r>
-              <a:rPr lang="en-US" dirty="0" smtClean="0"/>
-              <a:t>/3)</a:t>
+              <a:t>Evaluation Scenarios (1/3)</a:t>
             </a:r>
             <a:endParaRPr lang="en-US" dirty="0"/>
           </a:p>
@@ -7781,11 +7761,7 @@
             </a:r>
             <a:r>
               <a:rPr lang="en-US" dirty="0" smtClean="0"/>
-              <a:t>(2</a:t>
-            </a:r>
-            <a:r>
-              <a:rPr lang="en-US" dirty="0" smtClean="0"/>
-              <a:t>/3)</a:t>
+              <a:t>(2/3)</a:t>
             </a:r>
             <a:endParaRPr lang="en-US" dirty="0"/>
           </a:p>

</xml_diff>